<commit_message>
Update presentation with GitHub repository link
</commit_message>
<xml_diff>
--- a/Mental Health in Tech Survey.pptx
+++ b/Mental Health in Tech Survey.pptx
@@ -5,7 +5,7 @@
     <p:sldMasterId id="2147483659" r:id="rId1"/>
   </p:sldMasterIdLst>
   <p:notesMasterIdLst>
-    <p:notesMasterId r:id="rId28"/>
+    <p:notesMasterId r:id="rId29"/>
   </p:notesMasterIdLst>
   <p:sldIdLst>
     <p:sldId id="256" r:id="rId2"/>
@@ -34,6 +34,7 @@
     <p:sldId id="275" r:id="rId25"/>
     <p:sldId id="276" r:id="rId26"/>
     <p:sldId id="277" r:id="rId27"/>
+    <p:sldId id="286" r:id="rId28"/>
   </p:sldIdLst>
   <p:sldSz cx="9144000" cy="5143500" type="screen16x9"/>
   <p:notesSz cx="6858000" cy="9144000"/>
@@ -288,703 +289,9 @@
 <file path=ppt/revisionInfo.xml><?xml version="1.0" encoding="utf-8"?>
 <p1510:revInfo xmlns:a="http://schemas.openxmlformats.org/drawingml/2006/main" xmlns:r="http://schemas.openxmlformats.org/officeDocument/2006/relationships" xmlns:p1510="http://schemas.microsoft.com/office/powerpoint/2015/10/main">
   <p1510:revLst>
-    <p1510:client id="{C335D3B6-029A-4065-87FE-DE57AD19B9C6}" v="51" dt="2025-12-30T12:18:24.744"/>
+    <p1510:client id="{C335D3B6-029A-4065-87FE-DE57AD19B9C6}" v="57" dt="2025-12-30T13:09:40.401"/>
   </p1510:revLst>
 </p1510:revInfo>
-</file>
-
-<file path=ppt/changesInfos/changesInfo1.xml><?xml version="1.0" encoding="utf-8"?>
-<pc:chgInfo xmlns:a="http://schemas.openxmlformats.org/drawingml/2006/main" xmlns:r="http://schemas.openxmlformats.org/officeDocument/2006/relationships" xmlns:ac="http://schemas.microsoft.com/office/drawing/2013/main/command" xmlns:pc="http://schemas.microsoft.com/office/powerpoint/2013/main/command">
-  <pc:docChgLst>
-    <pc:chgData name="Anish Wadatkar" userId="409be691f56e0aa4" providerId="LiveId" clId="{FE36FFDD-CF39-40CA-B82B-3FB984666D92}"/>
-    <pc:docChg chg="custSel addSld delSld modSld sldOrd">
-      <pc:chgData name="Anish Wadatkar" userId="409be691f56e0aa4" providerId="LiveId" clId="{FE36FFDD-CF39-40CA-B82B-3FB984666D92}" dt="2025-12-30T12:19:03.450" v="400" actId="1076"/>
-      <pc:docMkLst>
-        <pc:docMk/>
-      </pc:docMkLst>
-      <pc:sldChg chg="modSp mod">
-        <pc:chgData name="Anish Wadatkar" userId="409be691f56e0aa4" providerId="LiveId" clId="{FE36FFDD-CF39-40CA-B82B-3FB984666D92}" dt="2025-12-30T11:26:24.374" v="141" actId="207"/>
-        <pc:sldMkLst>
-          <pc:docMk/>
-          <pc:sldMk cId="0" sldId="256"/>
-        </pc:sldMkLst>
-        <pc:spChg chg="mod">
-          <ac:chgData name="Anish Wadatkar" userId="409be691f56e0aa4" providerId="LiveId" clId="{FE36FFDD-CF39-40CA-B82B-3FB984666D92}" dt="2025-12-30T11:26:24.374" v="141" actId="207"/>
-          <ac:spMkLst>
-            <pc:docMk/>
-            <pc:sldMk cId="0" sldId="256"/>
-            <ac:spMk id="54" creationId="{00000000-0000-0000-0000-000000000000}"/>
-          </ac:spMkLst>
-        </pc:spChg>
-        <pc:spChg chg="mod">
-          <ac:chgData name="Anish Wadatkar" userId="409be691f56e0aa4" providerId="LiveId" clId="{FE36FFDD-CF39-40CA-B82B-3FB984666D92}" dt="2025-12-30T11:26:12.293" v="140" actId="207"/>
-          <ac:spMkLst>
-            <pc:docMk/>
-            <pc:sldMk cId="0" sldId="256"/>
-            <ac:spMk id="55" creationId="{00000000-0000-0000-0000-000000000000}"/>
-          </ac:spMkLst>
-        </pc:spChg>
-      </pc:sldChg>
-      <pc:sldChg chg="del">
-        <pc:chgData name="Anish Wadatkar" userId="409be691f56e0aa4" providerId="LiveId" clId="{FE36FFDD-CF39-40CA-B82B-3FB984666D92}" dt="2025-12-30T11:41:12.795" v="299" actId="2696"/>
-        <pc:sldMkLst>
-          <pc:docMk/>
-          <pc:sldMk cId="0" sldId="257"/>
-        </pc:sldMkLst>
-      </pc:sldChg>
-      <pc:sldChg chg="del">
-        <pc:chgData name="Anish Wadatkar" userId="409be691f56e0aa4" providerId="LiveId" clId="{FE36FFDD-CF39-40CA-B82B-3FB984666D92}" dt="2025-12-30T11:41:15.190" v="300" actId="2696"/>
-        <pc:sldMkLst>
-          <pc:docMk/>
-          <pc:sldMk cId="0" sldId="258"/>
-        </pc:sldMkLst>
-      </pc:sldChg>
-      <pc:sldChg chg="modSp mod">
-        <pc:chgData name="Anish Wadatkar" userId="409be691f56e0aa4" providerId="LiveId" clId="{FE36FFDD-CF39-40CA-B82B-3FB984666D92}" dt="2025-12-30T11:30:15.437" v="174" actId="1076"/>
-        <pc:sldMkLst>
-          <pc:docMk/>
-          <pc:sldMk cId="0" sldId="259"/>
-        </pc:sldMkLst>
-        <pc:spChg chg="mod">
-          <ac:chgData name="Anish Wadatkar" userId="409be691f56e0aa4" providerId="LiveId" clId="{FE36FFDD-CF39-40CA-B82B-3FB984666D92}" dt="2025-12-30T11:30:15.437" v="174" actId="1076"/>
-          <ac:spMkLst>
-            <pc:docMk/>
-            <pc:sldMk cId="0" sldId="259"/>
-            <ac:spMk id="74" creationId="{00000000-0000-0000-0000-000000000000}"/>
-          </ac:spMkLst>
-        </pc:spChg>
-        <pc:spChg chg="mod">
-          <ac:chgData name="Anish Wadatkar" userId="409be691f56e0aa4" providerId="LiveId" clId="{FE36FFDD-CF39-40CA-B82B-3FB984666D92}" dt="2025-12-30T11:30:05.503" v="172" actId="1076"/>
-          <ac:spMkLst>
-            <pc:docMk/>
-            <pc:sldMk cId="0" sldId="259"/>
-            <ac:spMk id="75" creationId="{00000000-0000-0000-0000-000000000000}"/>
-          </ac:spMkLst>
-        </pc:spChg>
-      </pc:sldChg>
-      <pc:sldChg chg="modSp mod">
-        <pc:chgData name="Anish Wadatkar" userId="409be691f56e0aa4" providerId="LiveId" clId="{FE36FFDD-CF39-40CA-B82B-3FB984666D92}" dt="2025-12-30T11:25:28.076" v="135" actId="27636"/>
-        <pc:sldMkLst>
-          <pc:docMk/>
-          <pc:sldMk cId="0" sldId="260"/>
-        </pc:sldMkLst>
-        <pc:spChg chg="mod">
-          <ac:chgData name="Anish Wadatkar" userId="409be691f56e0aa4" providerId="LiveId" clId="{FE36FFDD-CF39-40CA-B82B-3FB984666D92}" dt="2025-12-30T11:18:29.078" v="64" actId="14100"/>
-          <ac:spMkLst>
-            <pc:docMk/>
-            <pc:sldMk cId="0" sldId="260"/>
-            <ac:spMk id="80" creationId="{00000000-0000-0000-0000-000000000000}"/>
-          </ac:spMkLst>
-        </pc:spChg>
-        <pc:spChg chg="mod">
-          <ac:chgData name="Anish Wadatkar" userId="409be691f56e0aa4" providerId="LiveId" clId="{FE36FFDD-CF39-40CA-B82B-3FB984666D92}" dt="2025-12-30T11:25:28.076" v="135" actId="27636"/>
-          <ac:spMkLst>
-            <pc:docMk/>
-            <pc:sldMk cId="0" sldId="260"/>
-            <ac:spMk id="81" creationId="{00000000-0000-0000-0000-000000000000}"/>
-          </ac:spMkLst>
-        </pc:spChg>
-      </pc:sldChg>
-      <pc:sldChg chg="modSp mod">
-        <pc:chgData name="Anish Wadatkar" userId="409be691f56e0aa4" providerId="LiveId" clId="{FE36FFDD-CF39-40CA-B82B-3FB984666D92}" dt="2025-12-30T11:25:21.561" v="133" actId="255"/>
-        <pc:sldMkLst>
-          <pc:docMk/>
-          <pc:sldMk cId="0" sldId="261"/>
-        </pc:sldMkLst>
-        <pc:spChg chg="mod">
-          <ac:chgData name="Anish Wadatkar" userId="409be691f56e0aa4" providerId="LiveId" clId="{FE36FFDD-CF39-40CA-B82B-3FB984666D92}" dt="2025-12-30T11:19:59.532" v="78" actId="14100"/>
-          <ac:spMkLst>
-            <pc:docMk/>
-            <pc:sldMk cId="0" sldId="261"/>
-            <ac:spMk id="86" creationId="{00000000-0000-0000-0000-000000000000}"/>
-          </ac:spMkLst>
-        </pc:spChg>
-        <pc:spChg chg="mod">
-          <ac:chgData name="Anish Wadatkar" userId="409be691f56e0aa4" providerId="LiveId" clId="{FE36FFDD-CF39-40CA-B82B-3FB984666D92}" dt="2025-12-30T11:25:21.561" v="133" actId="255"/>
-          <ac:spMkLst>
-            <pc:docMk/>
-            <pc:sldMk cId="0" sldId="261"/>
-            <ac:spMk id="87" creationId="{00000000-0000-0000-0000-000000000000}"/>
-          </ac:spMkLst>
-        </pc:spChg>
-      </pc:sldChg>
-      <pc:sldChg chg="modSp mod">
-        <pc:chgData name="Anish Wadatkar" userId="409be691f56e0aa4" providerId="LiveId" clId="{FE36FFDD-CF39-40CA-B82B-3FB984666D92}" dt="2025-12-30T11:29:46.996" v="171" actId="207"/>
-        <pc:sldMkLst>
-          <pc:docMk/>
-          <pc:sldMk cId="0" sldId="262"/>
-        </pc:sldMkLst>
-        <pc:spChg chg="mod">
-          <ac:chgData name="Anish Wadatkar" userId="409be691f56e0aa4" providerId="LiveId" clId="{FE36FFDD-CF39-40CA-B82B-3FB984666D92}" dt="2025-12-30T11:21:24.444" v="91" actId="14100"/>
-          <ac:spMkLst>
-            <pc:docMk/>
-            <pc:sldMk cId="0" sldId="262"/>
-            <ac:spMk id="92" creationId="{00000000-0000-0000-0000-000000000000}"/>
-          </ac:spMkLst>
-        </pc:spChg>
-        <pc:spChg chg="mod">
-          <ac:chgData name="Anish Wadatkar" userId="409be691f56e0aa4" providerId="LiveId" clId="{FE36FFDD-CF39-40CA-B82B-3FB984666D92}" dt="2025-12-30T11:29:46.996" v="171" actId="207"/>
-          <ac:spMkLst>
-            <pc:docMk/>
-            <pc:sldMk cId="0" sldId="262"/>
-            <ac:spMk id="93" creationId="{00000000-0000-0000-0000-000000000000}"/>
-          </ac:spMkLst>
-        </pc:spChg>
-      </pc:sldChg>
-      <pc:sldChg chg="modSp mod">
-        <pc:chgData name="Anish Wadatkar" userId="409be691f56e0aa4" providerId="LiveId" clId="{FE36FFDD-CF39-40CA-B82B-3FB984666D92}" dt="2025-12-30T11:26:41.619" v="143" actId="255"/>
-        <pc:sldMkLst>
-          <pc:docMk/>
-          <pc:sldMk cId="0" sldId="263"/>
-        </pc:sldMkLst>
-        <pc:spChg chg="mod">
-          <ac:chgData name="Anish Wadatkar" userId="409be691f56e0aa4" providerId="LiveId" clId="{FE36FFDD-CF39-40CA-B82B-3FB984666D92}" dt="2025-12-30T11:23:33.840" v="117" actId="14100"/>
-          <ac:spMkLst>
-            <pc:docMk/>
-            <pc:sldMk cId="0" sldId="263"/>
-            <ac:spMk id="98" creationId="{00000000-0000-0000-0000-000000000000}"/>
-          </ac:spMkLst>
-        </pc:spChg>
-        <pc:spChg chg="mod">
-          <ac:chgData name="Anish Wadatkar" userId="409be691f56e0aa4" providerId="LiveId" clId="{FE36FFDD-CF39-40CA-B82B-3FB984666D92}" dt="2025-12-30T11:26:41.619" v="143" actId="255"/>
-          <ac:spMkLst>
-            <pc:docMk/>
-            <pc:sldMk cId="0" sldId="263"/>
-            <ac:spMk id="99" creationId="{00000000-0000-0000-0000-000000000000}"/>
-          </ac:spMkLst>
-        </pc:spChg>
-      </pc:sldChg>
-      <pc:sldChg chg="modSp mod">
-        <pc:chgData name="Anish Wadatkar" userId="409be691f56e0aa4" providerId="LiveId" clId="{FE36FFDD-CF39-40CA-B82B-3FB984666D92}" dt="2025-12-30T11:27:15.144" v="152" actId="5793"/>
-        <pc:sldMkLst>
-          <pc:docMk/>
-          <pc:sldMk cId="0" sldId="264"/>
-        </pc:sldMkLst>
-        <pc:spChg chg="mod">
-          <ac:chgData name="Anish Wadatkar" userId="409be691f56e0aa4" providerId="LiveId" clId="{FE36FFDD-CF39-40CA-B82B-3FB984666D92}" dt="2025-12-30T11:24:35.658" v="126" actId="1076"/>
-          <ac:spMkLst>
-            <pc:docMk/>
-            <pc:sldMk cId="0" sldId="264"/>
-            <ac:spMk id="104" creationId="{00000000-0000-0000-0000-000000000000}"/>
-          </ac:spMkLst>
-        </pc:spChg>
-        <pc:spChg chg="mod">
-          <ac:chgData name="Anish Wadatkar" userId="409be691f56e0aa4" providerId="LiveId" clId="{FE36FFDD-CF39-40CA-B82B-3FB984666D92}" dt="2025-12-30T11:27:15.144" v="152" actId="5793"/>
-          <ac:spMkLst>
-            <pc:docMk/>
-            <pc:sldMk cId="0" sldId="264"/>
-            <ac:spMk id="105" creationId="{00000000-0000-0000-0000-000000000000}"/>
-          </ac:spMkLst>
-        </pc:spChg>
-      </pc:sldChg>
-      <pc:sldChg chg="modSp mod">
-        <pc:chgData name="Anish Wadatkar" userId="409be691f56e0aa4" providerId="LiveId" clId="{FE36FFDD-CF39-40CA-B82B-3FB984666D92}" dt="2025-12-30T11:30:35.013" v="175" actId="20577"/>
-        <pc:sldMkLst>
-          <pc:docMk/>
-          <pc:sldMk cId="0" sldId="265"/>
-        </pc:sldMkLst>
-        <pc:spChg chg="mod">
-          <ac:chgData name="Anish Wadatkar" userId="409be691f56e0aa4" providerId="LiveId" clId="{FE36FFDD-CF39-40CA-B82B-3FB984666D92}" dt="2025-12-30T11:27:35.255" v="155" actId="1076"/>
-          <ac:spMkLst>
-            <pc:docMk/>
-            <pc:sldMk cId="0" sldId="265"/>
-            <ac:spMk id="110" creationId="{00000000-0000-0000-0000-000000000000}"/>
-          </ac:spMkLst>
-        </pc:spChg>
-        <pc:spChg chg="mod">
-          <ac:chgData name="Anish Wadatkar" userId="409be691f56e0aa4" providerId="LiveId" clId="{FE36FFDD-CF39-40CA-B82B-3FB984666D92}" dt="2025-12-30T11:30:35.013" v="175" actId="20577"/>
-          <ac:spMkLst>
-            <pc:docMk/>
-            <pc:sldMk cId="0" sldId="265"/>
-            <ac:spMk id="111" creationId="{00000000-0000-0000-0000-000000000000}"/>
-          </ac:spMkLst>
-        </pc:spChg>
-      </pc:sldChg>
-      <pc:sldChg chg="new del ord">
-        <pc:chgData name="Anish Wadatkar" userId="409be691f56e0aa4" providerId="LiveId" clId="{FE36FFDD-CF39-40CA-B82B-3FB984666D92}" dt="2025-12-30T11:09:25.066" v="31" actId="2696"/>
-        <pc:sldMkLst>
-          <pc:docMk/>
-          <pc:sldMk cId="1425151853" sldId="266"/>
-        </pc:sldMkLst>
-      </pc:sldChg>
-      <pc:sldChg chg="modSp new mod ord">
-        <pc:chgData name="Anish Wadatkar" userId="409be691f56e0aa4" providerId="LiveId" clId="{FE36FFDD-CF39-40CA-B82B-3FB984666D92}" dt="2025-12-30T11:26:03.195" v="139" actId="207"/>
-        <pc:sldMkLst>
-          <pc:docMk/>
-          <pc:sldMk cId="714662056" sldId="267"/>
-        </pc:sldMkLst>
-        <pc:spChg chg="mod">
-          <ac:chgData name="Anish Wadatkar" userId="409be691f56e0aa4" providerId="LiveId" clId="{FE36FFDD-CF39-40CA-B82B-3FB984666D92}" dt="2025-12-30T11:10:19.749" v="40" actId="14100"/>
-          <ac:spMkLst>
-            <pc:docMk/>
-            <pc:sldMk cId="714662056" sldId="267"/>
-            <ac:spMk id="2" creationId="{3687CF96-8D24-D9A3-725F-26120FF0E974}"/>
-          </ac:spMkLst>
-        </pc:spChg>
-        <pc:spChg chg="mod">
-          <ac:chgData name="Anish Wadatkar" userId="409be691f56e0aa4" providerId="LiveId" clId="{FE36FFDD-CF39-40CA-B82B-3FB984666D92}" dt="2025-12-30T11:26:03.195" v="139" actId="207"/>
-          <ac:spMkLst>
-            <pc:docMk/>
-            <pc:sldMk cId="714662056" sldId="267"/>
-            <ac:spMk id="3" creationId="{38056374-FDFE-D85D-20A0-F41EABBF57AE}"/>
-          </ac:spMkLst>
-        </pc:spChg>
-      </pc:sldChg>
-      <pc:sldChg chg="modSp new mod">
-        <pc:chgData name="Anish Wadatkar" userId="409be691f56e0aa4" providerId="LiveId" clId="{FE36FFDD-CF39-40CA-B82B-3FB984666D92}" dt="2025-12-30T11:32:06.407" v="189" actId="1076"/>
-        <pc:sldMkLst>
-          <pc:docMk/>
-          <pc:sldMk cId="23041898" sldId="268"/>
-        </pc:sldMkLst>
-        <pc:spChg chg="mod">
-          <ac:chgData name="Anish Wadatkar" userId="409be691f56e0aa4" providerId="LiveId" clId="{FE36FFDD-CF39-40CA-B82B-3FB984666D92}" dt="2025-12-30T11:31:25.192" v="181" actId="1076"/>
-          <ac:spMkLst>
-            <pc:docMk/>
-            <pc:sldMk cId="23041898" sldId="268"/>
-            <ac:spMk id="2" creationId="{72757178-039B-8E55-AC73-677BA93A4ACF}"/>
-          </ac:spMkLst>
-        </pc:spChg>
-        <pc:spChg chg="mod">
-          <ac:chgData name="Anish Wadatkar" userId="409be691f56e0aa4" providerId="LiveId" clId="{FE36FFDD-CF39-40CA-B82B-3FB984666D92}" dt="2025-12-30T11:32:06.407" v="189" actId="1076"/>
-          <ac:spMkLst>
-            <pc:docMk/>
-            <pc:sldMk cId="23041898" sldId="268"/>
-            <ac:spMk id="3" creationId="{87D9B00C-9224-61A4-62C9-B37D1EBA592F}"/>
-          </ac:spMkLst>
-        </pc:spChg>
-      </pc:sldChg>
-      <pc:sldChg chg="modSp new mod">
-        <pc:chgData name="Anish Wadatkar" userId="409be691f56e0aa4" providerId="LiveId" clId="{FE36FFDD-CF39-40CA-B82B-3FB984666D92}" dt="2025-12-30T11:33:02.485" v="199" actId="207"/>
-        <pc:sldMkLst>
-          <pc:docMk/>
-          <pc:sldMk cId="3655629473" sldId="269"/>
-        </pc:sldMkLst>
-        <pc:spChg chg="mod">
-          <ac:chgData name="Anish Wadatkar" userId="409be691f56e0aa4" providerId="LiveId" clId="{FE36FFDD-CF39-40CA-B82B-3FB984666D92}" dt="2025-12-30T11:32:40.191" v="194" actId="1076"/>
-          <ac:spMkLst>
-            <pc:docMk/>
-            <pc:sldMk cId="3655629473" sldId="269"/>
-            <ac:spMk id="2" creationId="{8B464709-3AF2-5277-479C-C9BAAA710C40}"/>
-          </ac:spMkLst>
-        </pc:spChg>
-        <pc:spChg chg="mod">
-          <ac:chgData name="Anish Wadatkar" userId="409be691f56e0aa4" providerId="LiveId" clId="{FE36FFDD-CF39-40CA-B82B-3FB984666D92}" dt="2025-12-30T11:33:02.485" v="199" actId="207"/>
-          <ac:spMkLst>
-            <pc:docMk/>
-            <pc:sldMk cId="3655629473" sldId="269"/>
-            <ac:spMk id="3" creationId="{E491C334-D4BE-11A7-B9CE-82E0B0BAE4CF}"/>
-          </ac:spMkLst>
-        </pc:spChg>
-      </pc:sldChg>
-      <pc:sldChg chg="modSp new mod">
-        <pc:chgData name="Anish Wadatkar" userId="409be691f56e0aa4" providerId="LiveId" clId="{FE36FFDD-CF39-40CA-B82B-3FB984666D92}" dt="2025-12-30T11:34:21.040" v="216" actId="1076"/>
-        <pc:sldMkLst>
-          <pc:docMk/>
-          <pc:sldMk cId="4216060872" sldId="270"/>
-        </pc:sldMkLst>
-        <pc:spChg chg="mod">
-          <ac:chgData name="Anish Wadatkar" userId="409be691f56e0aa4" providerId="LiveId" clId="{FE36FFDD-CF39-40CA-B82B-3FB984666D92}" dt="2025-12-30T11:33:47.446" v="208" actId="1076"/>
-          <ac:spMkLst>
-            <pc:docMk/>
-            <pc:sldMk cId="4216060872" sldId="270"/>
-            <ac:spMk id="2" creationId="{D8ED4023-5CE7-FD36-C79E-524769800A0D}"/>
-          </ac:spMkLst>
-        </pc:spChg>
-        <pc:spChg chg="mod">
-          <ac:chgData name="Anish Wadatkar" userId="409be691f56e0aa4" providerId="LiveId" clId="{FE36FFDD-CF39-40CA-B82B-3FB984666D92}" dt="2025-12-30T11:34:21.040" v="216" actId="1076"/>
-          <ac:spMkLst>
-            <pc:docMk/>
-            <pc:sldMk cId="4216060872" sldId="270"/>
-            <ac:spMk id="3" creationId="{4855595F-5E65-67B8-8DA3-66068B0D08F3}"/>
-          </ac:spMkLst>
-        </pc:spChg>
-      </pc:sldChg>
-      <pc:sldChg chg="addSp delSp modSp new del mod">
-        <pc:chgData name="Anish Wadatkar" userId="409be691f56e0aa4" providerId="LiveId" clId="{FE36FFDD-CF39-40CA-B82B-3FB984666D92}" dt="2025-12-30T11:35:04.199" v="236" actId="2696"/>
-        <pc:sldMkLst>
-          <pc:docMk/>
-          <pc:sldMk cId="3789073701" sldId="271"/>
-        </pc:sldMkLst>
-        <pc:spChg chg="mod">
-          <ac:chgData name="Anish Wadatkar" userId="409be691f56e0aa4" providerId="LiveId" clId="{FE36FFDD-CF39-40CA-B82B-3FB984666D92}" dt="2025-12-30T11:33:37.312" v="205" actId="27636"/>
-          <ac:spMkLst>
-            <pc:docMk/>
-            <pc:sldMk cId="3789073701" sldId="271"/>
-            <ac:spMk id="2" creationId="{6EA9E155-5BE7-EDA0-AAA5-6B91D49867D9}"/>
-          </ac:spMkLst>
-        </pc:spChg>
-        <pc:spChg chg="add del mod">
-          <ac:chgData name="Anish Wadatkar" userId="409be691f56e0aa4" providerId="LiveId" clId="{FE36FFDD-CF39-40CA-B82B-3FB984666D92}" dt="2025-12-30T11:35:02.810" v="235"/>
-          <ac:spMkLst>
-            <pc:docMk/>
-            <pc:sldMk cId="3789073701" sldId="271"/>
-            <ac:spMk id="5" creationId="{5C4A2420-1E9F-ED84-8531-D0B308DC880E}"/>
-          </ac:spMkLst>
-        </pc:spChg>
-      </pc:sldChg>
-      <pc:sldChg chg="modSp new mod">
-        <pc:chgData name="Anish Wadatkar" userId="409be691f56e0aa4" providerId="LiveId" clId="{FE36FFDD-CF39-40CA-B82B-3FB984666D92}" dt="2025-12-30T11:35:43.311" v="246" actId="27636"/>
-        <pc:sldMkLst>
-          <pc:docMk/>
-          <pc:sldMk cId="1678045749" sldId="272"/>
-        </pc:sldMkLst>
-        <pc:spChg chg="mod">
-          <ac:chgData name="Anish Wadatkar" userId="409be691f56e0aa4" providerId="LiveId" clId="{FE36FFDD-CF39-40CA-B82B-3FB984666D92}" dt="2025-12-30T11:35:18.948" v="240" actId="1076"/>
-          <ac:spMkLst>
-            <pc:docMk/>
-            <pc:sldMk cId="1678045749" sldId="272"/>
-            <ac:spMk id="2" creationId="{2CABECEF-978E-B843-318D-9073FF664CF9}"/>
-          </ac:spMkLst>
-        </pc:spChg>
-        <pc:spChg chg="mod">
-          <ac:chgData name="Anish Wadatkar" userId="409be691f56e0aa4" providerId="LiveId" clId="{FE36FFDD-CF39-40CA-B82B-3FB984666D92}" dt="2025-12-30T11:35:43.311" v="246" actId="27636"/>
-          <ac:spMkLst>
-            <pc:docMk/>
-            <pc:sldMk cId="1678045749" sldId="272"/>
-            <ac:spMk id="3" creationId="{0D5613DE-2DBD-7E5B-C1CB-5DCA0FCFF330}"/>
-          </ac:spMkLst>
-        </pc:spChg>
-      </pc:sldChg>
-      <pc:sldChg chg="modSp new mod">
-        <pc:chgData name="Anish Wadatkar" userId="409be691f56e0aa4" providerId="LiveId" clId="{FE36FFDD-CF39-40CA-B82B-3FB984666D92}" dt="2025-12-30T11:36:34.783" v="257" actId="207"/>
-        <pc:sldMkLst>
-          <pc:docMk/>
-          <pc:sldMk cId="1963099837" sldId="273"/>
-        </pc:sldMkLst>
-        <pc:spChg chg="mod">
-          <ac:chgData name="Anish Wadatkar" userId="409be691f56e0aa4" providerId="LiveId" clId="{FE36FFDD-CF39-40CA-B82B-3FB984666D92}" dt="2025-12-30T11:36:14.299" v="251" actId="1076"/>
-          <ac:spMkLst>
-            <pc:docMk/>
-            <pc:sldMk cId="1963099837" sldId="273"/>
-            <ac:spMk id="2" creationId="{BADC37D8-6B55-67DC-62F1-0845BF0DB14F}"/>
-          </ac:spMkLst>
-        </pc:spChg>
-        <pc:spChg chg="mod">
-          <ac:chgData name="Anish Wadatkar" userId="409be691f56e0aa4" providerId="LiveId" clId="{FE36FFDD-CF39-40CA-B82B-3FB984666D92}" dt="2025-12-30T11:36:34.783" v="257" actId="207"/>
-          <ac:spMkLst>
-            <pc:docMk/>
-            <pc:sldMk cId="1963099837" sldId="273"/>
-            <ac:spMk id="3" creationId="{EE1C372B-811A-58A3-3857-9AA3504CF1B1}"/>
-          </ac:spMkLst>
-        </pc:spChg>
-      </pc:sldChg>
-      <pc:sldChg chg="modSp new mod">
-        <pc:chgData name="Anish Wadatkar" userId="409be691f56e0aa4" providerId="LiveId" clId="{FE36FFDD-CF39-40CA-B82B-3FB984666D92}" dt="2025-12-30T11:37:07.559" v="265" actId="207"/>
-        <pc:sldMkLst>
-          <pc:docMk/>
-          <pc:sldMk cId="3740487608" sldId="274"/>
-        </pc:sldMkLst>
-        <pc:spChg chg="mod">
-          <ac:chgData name="Anish Wadatkar" userId="409be691f56e0aa4" providerId="LiveId" clId="{FE36FFDD-CF39-40CA-B82B-3FB984666D92}" dt="2025-12-30T11:36:52.603" v="262" actId="1076"/>
-          <ac:spMkLst>
-            <pc:docMk/>
-            <pc:sldMk cId="3740487608" sldId="274"/>
-            <ac:spMk id="2" creationId="{EE578FDA-806D-356A-8005-624AC0D79C28}"/>
-          </ac:spMkLst>
-        </pc:spChg>
-        <pc:spChg chg="mod">
-          <ac:chgData name="Anish Wadatkar" userId="409be691f56e0aa4" providerId="LiveId" clId="{FE36FFDD-CF39-40CA-B82B-3FB984666D92}" dt="2025-12-30T11:37:07.559" v="265" actId="207"/>
-          <ac:spMkLst>
-            <pc:docMk/>
-            <pc:sldMk cId="3740487608" sldId="274"/>
-            <ac:spMk id="3" creationId="{C6CC04D7-0083-4C74-F0AF-DDD23CFCAA2A}"/>
-          </ac:spMkLst>
-        </pc:spChg>
-      </pc:sldChg>
-      <pc:sldChg chg="modSp new mod">
-        <pc:chgData name="Anish Wadatkar" userId="409be691f56e0aa4" providerId="LiveId" clId="{FE36FFDD-CF39-40CA-B82B-3FB984666D92}" dt="2025-12-30T11:37:50.713" v="274" actId="207"/>
-        <pc:sldMkLst>
-          <pc:docMk/>
-          <pc:sldMk cId="4019598410" sldId="275"/>
-        </pc:sldMkLst>
-        <pc:spChg chg="mod">
-          <ac:chgData name="Anish Wadatkar" userId="409be691f56e0aa4" providerId="LiveId" clId="{FE36FFDD-CF39-40CA-B82B-3FB984666D92}" dt="2025-12-30T11:37:36.724" v="270" actId="1076"/>
-          <ac:spMkLst>
-            <pc:docMk/>
-            <pc:sldMk cId="4019598410" sldId="275"/>
-            <ac:spMk id="2" creationId="{EF19A5C2-12D3-0792-B429-D32B2C22B6AC}"/>
-          </ac:spMkLst>
-        </pc:spChg>
-        <pc:spChg chg="mod">
-          <ac:chgData name="Anish Wadatkar" userId="409be691f56e0aa4" providerId="LiveId" clId="{FE36FFDD-CF39-40CA-B82B-3FB984666D92}" dt="2025-12-30T11:37:50.713" v="274" actId="207"/>
-          <ac:spMkLst>
-            <pc:docMk/>
-            <pc:sldMk cId="4019598410" sldId="275"/>
-            <ac:spMk id="3" creationId="{4CAAD30D-B147-9667-6040-DBD71BA03965}"/>
-          </ac:spMkLst>
-        </pc:spChg>
-      </pc:sldChg>
-      <pc:sldChg chg="modSp new mod">
-        <pc:chgData name="Anish Wadatkar" userId="409be691f56e0aa4" providerId="LiveId" clId="{FE36FFDD-CF39-40CA-B82B-3FB984666D92}" dt="2025-12-30T11:38:35.160" v="285" actId="207"/>
-        <pc:sldMkLst>
-          <pc:docMk/>
-          <pc:sldMk cId="2016751072" sldId="276"/>
-        </pc:sldMkLst>
-        <pc:spChg chg="mod">
-          <ac:chgData name="Anish Wadatkar" userId="409be691f56e0aa4" providerId="LiveId" clId="{FE36FFDD-CF39-40CA-B82B-3FB984666D92}" dt="2025-12-30T11:38:19.081" v="280" actId="1076"/>
-          <ac:spMkLst>
-            <pc:docMk/>
-            <pc:sldMk cId="2016751072" sldId="276"/>
-            <ac:spMk id="2" creationId="{C194962C-F20D-6FF2-B2A7-33207E6F33DB}"/>
-          </ac:spMkLst>
-        </pc:spChg>
-        <pc:spChg chg="mod">
-          <ac:chgData name="Anish Wadatkar" userId="409be691f56e0aa4" providerId="LiveId" clId="{FE36FFDD-CF39-40CA-B82B-3FB984666D92}" dt="2025-12-30T11:38:35.160" v="285" actId="207"/>
-          <ac:spMkLst>
-            <pc:docMk/>
-            <pc:sldMk cId="2016751072" sldId="276"/>
-            <ac:spMk id="3" creationId="{24F69FDD-7E73-57D0-088D-14428E7A2829}"/>
-          </ac:spMkLst>
-        </pc:spChg>
-      </pc:sldChg>
-      <pc:sldChg chg="modSp new mod">
-        <pc:chgData name="Anish Wadatkar" userId="409be691f56e0aa4" providerId="LiveId" clId="{FE36FFDD-CF39-40CA-B82B-3FB984666D92}" dt="2025-12-30T11:39:28.702" v="298" actId="27636"/>
-        <pc:sldMkLst>
-          <pc:docMk/>
-          <pc:sldMk cId="2379224717" sldId="277"/>
-        </pc:sldMkLst>
-        <pc:spChg chg="mod">
-          <ac:chgData name="Anish Wadatkar" userId="409be691f56e0aa4" providerId="LiveId" clId="{FE36FFDD-CF39-40CA-B82B-3FB984666D92}" dt="2025-12-30T11:39:00.061" v="290" actId="1076"/>
-          <ac:spMkLst>
-            <pc:docMk/>
-            <pc:sldMk cId="2379224717" sldId="277"/>
-            <ac:spMk id="2" creationId="{86056801-63EE-158F-0E37-811F9F1E12C1}"/>
-          </ac:spMkLst>
-        </pc:spChg>
-        <pc:spChg chg="mod">
-          <ac:chgData name="Anish Wadatkar" userId="409be691f56e0aa4" providerId="LiveId" clId="{FE36FFDD-CF39-40CA-B82B-3FB984666D92}" dt="2025-12-30T11:39:28.702" v="298" actId="27636"/>
-          <ac:spMkLst>
-            <pc:docMk/>
-            <pc:sldMk cId="2379224717" sldId="277"/>
-            <ac:spMk id="3" creationId="{3521AA62-C530-0D06-C233-E7CFFA614AE7}"/>
-          </ac:spMkLst>
-        </pc:spChg>
-      </pc:sldChg>
-      <pc:sldChg chg="addSp modSp new mod ord">
-        <pc:chgData name="Anish Wadatkar" userId="409be691f56e0aa4" providerId="LiveId" clId="{FE36FFDD-CF39-40CA-B82B-3FB984666D92}" dt="2025-12-30T12:09:11.901" v="325" actId="1076"/>
-        <pc:sldMkLst>
-          <pc:docMk/>
-          <pc:sldMk cId="3487893974" sldId="278"/>
-        </pc:sldMkLst>
-        <pc:spChg chg="mod">
-          <ac:chgData name="Anish Wadatkar" userId="409be691f56e0aa4" providerId="LiveId" clId="{FE36FFDD-CF39-40CA-B82B-3FB984666D92}" dt="2025-12-30T12:09:03.869" v="323" actId="255"/>
-          <ac:spMkLst>
-            <pc:docMk/>
-            <pc:sldMk cId="3487893974" sldId="278"/>
-            <ac:spMk id="2" creationId="{2F0EAC00-15F6-157D-E129-5EE860685433}"/>
-          </ac:spMkLst>
-        </pc:spChg>
-        <pc:picChg chg="add mod">
-          <ac:chgData name="Anish Wadatkar" userId="409be691f56e0aa4" providerId="LiveId" clId="{FE36FFDD-CF39-40CA-B82B-3FB984666D92}" dt="2025-12-30T12:09:11.901" v="325" actId="1076"/>
-          <ac:picMkLst>
-            <pc:docMk/>
-            <pc:sldMk cId="3487893974" sldId="278"/>
-            <ac:picMk id="4" creationId="{98FA481C-33A9-4814-1E5E-9296C3FBD905}"/>
-          </ac:picMkLst>
-        </pc:picChg>
-      </pc:sldChg>
-      <pc:sldChg chg="addSp modSp new del mod">
-        <pc:chgData name="Anish Wadatkar" userId="409be691f56e0aa4" providerId="LiveId" clId="{FE36FFDD-CF39-40CA-B82B-3FB984666D92}" dt="2025-12-30T12:08:25.285" v="313" actId="2696"/>
-        <pc:sldMkLst>
-          <pc:docMk/>
-          <pc:sldMk cId="3864717406" sldId="278"/>
-        </pc:sldMkLst>
-        <pc:spChg chg="mod">
-          <ac:chgData name="Anish Wadatkar" userId="409be691f56e0aa4" providerId="LiveId" clId="{FE36FFDD-CF39-40CA-B82B-3FB984666D92}" dt="2025-12-30T12:07:48.093" v="308" actId="1076"/>
-          <ac:spMkLst>
-            <pc:docMk/>
-            <pc:sldMk cId="3864717406" sldId="278"/>
-            <ac:spMk id="2" creationId="{6098D8CB-090A-9EEF-920D-A8B337861176}"/>
-          </ac:spMkLst>
-        </pc:spChg>
-        <pc:picChg chg="add mod">
-          <ac:chgData name="Anish Wadatkar" userId="409be691f56e0aa4" providerId="LiveId" clId="{FE36FFDD-CF39-40CA-B82B-3FB984666D92}" dt="2025-12-30T12:08:00.581" v="312" actId="1076"/>
-          <ac:picMkLst>
-            <pc:docMk/>
-            <pc:sldMk cId="3864717406" sldId="278"/>
-            <ac:picMk id="5" creationId="{F8E926F6-8E9B-F5C9-9B12-634DA7D4F87B}"/>
-          </ac:picMkLst>
-        </pc:picChg>
-      </pc:sldChg>
-      <pc:sldChg chg="addSp modSp new mod">
-        <pc:chgData name="Anish Wadatkar" userId="409be691f56e0aa4" providerId="LiveId" clId="{FE36FFDD-CF39-40CA-B82B-3FB984666D92}" dt="2025-12-30T12:13:11.269" v="348" actId="1076"/>
-        <pc:sldMkLst>
-          <pc:docMk/>
-          <pc:sldMk cId="1150507385" sldId="279"/>
-        </pc:sldMkLst>
-        <pc:spChg chg="mod">
-          <ac:chgData name="Anish Wadatkar" userId="409be691f56e0aa4" providerId="LiveId" clId="{FE36FFDD-CF39-40CA-B82B-3FB984666D92}" dt="2025-12-30T12:13:08.029" v="347" actId="1076"/>
-          <ac:spMkLst>
-            <pc:docMk/>
-            <pc:sldMk cId="1150507385" sldId="279"/>
-            <ac:spMk id="2" creationId="{9F264053-665A-DC58-FCA5-EDDD1B13D236}"/>
-          </ac:spMkLst>
-        </pc:spChg>
-        <pc:picChg chg="add mod">
-          <ac:chgData name="Anish Wadatkar" userId="409be691f56e0aa4" providerId="LiveId" clId="{FE36FFDD-CF39-40CA-B82B-3FB984666D92}" dt="2025-12-30T12:13:11.269" v="348" actId="1076"/>
-          <ac:picMkLst>
-            <pc:docMk/>
-            <pc:sldMk cId="1150507385" sldId="279"/>
-            <ac:picMk id="4" creationId="{D9890820-AEEB-2B4B-4E0A-4768A6744420}"/>
-          </ac:picMkLst>
-        </pc:picChg>
-      </pc:sldChg>
-      <pc:sldChg chg="addSp modSp new mod">
-        <pc:chgData name="Anish Wadatkar" userId="409be691f56e0aa4" providerId="LiveId" clId="{FE36FFDD-CF39-40CA-B82B-3FB984666D92}" dt="2025-12-30T12:14:26.036" v="358" actId="1076"/>
-        <pc:sldMkLst>
-          <pc:docMk/>
-          <pc:sldMk cId="265219917" sldId="280"/>
-        </pc:sldMkLst>
-        <pc:spChg chg="mod">
-          <ac:chgData name="Anish Wadatkar" userId="409be691f56e0aa4" providerId="LiveId" clId="{FE36FFDD-CF39-40CA-B82B-3FB984666D92}" dt="2025-12-30T12:14:20.232" v="357" actId="1076"/>
-          <ac:spMkLst>
-            <pc:docMk/>
-            <pc:sldMk cId="265219917" sldId="280"/>
-            <ac:spMk id="2" creationId="{36C89556-E744-112F-FE02-C7052F7C02DE}"/>
-          </ac:spMkLst>
-        </pc:spChg>
-        <pc:picChg chg="add mod">
-          <ac:chgData name="Anish Wadatkar" userId="409be691f56e0aa4" providerId="LiveId" clId="{FE36FFDD-CF39-40CA-B82B-3FB984666D92}" dt="2025-12-30T12:14:26.036" v="358" actId="1076"/>
-          <ac:picMkLst>
-            <pc:docMk/>
-            <pc:sldMk cId="265219917" sldId="280"/>
-            <ac:picMk id="4" creationId="{D51FDC26-EAF5-7D26-34F8-F00D6999C918}"/>
-          </ac:picMkLst>
-        </pc:picChg>
-      </pc:sldChg>
-      <pc:sldChg chg="addSp modSp new mod">
-        <pc:chgData name="Anish Wadatkar" userId="409be691f56e0aa4" providerId="LiveId" clId="{FE36FFDD-CF39-40CA-B82B-3FB984666D92}" dt="2025-12-30T12:15:10.141" v="364" actId="1076"/>
-        <pc:sldMkLst>
-          <pc:docMk/>
-          <pc:sldMk cId="3555251420" sldId="281"/>
-        </pc:sldMkLst>
-        <pc:spChg chg="mod">
-          <ac:chgData name="Anish Wadatkar" userId="409be691f56e0aa4" providerId="LiveId" clId="{FE36FFDD-CF39-40CA-B82B-3FB984666D92}" dt="2025-12-30T12:14:49.355" v="362" actId="1076"/>
-          <ac:spMkLst>
-            <pc:docMk/>
-            <pc:sldMk cId="3555251420" sldId="281"/>
-            <ac:spMk id="2" creationId="{90D431CA-0868-A5D4-8313-A907E468DAA1}"/>
-          </ac:spMkLst>
-        </pc:spChg>
-        <pc:picChg chg="add mod">
-          <ac:chgData name="Anish Wadatkar" userId="409be691f56e0aa4" providerId="LiveId" clId="{FE36FFDD-CF39-40CA-B82B-3FB984666D92}" dt="2025-12-30T12:15:10.141" v="364" actId="1076"/>
-          <ac:picMkLst>
-            <pc:docMk/>
-            <pc:sldMk cId="3555251420" sldId="281"/>
-            <ac:picMk id="4" creationId="{DF21B4DB-D9B9-4B45-A8A1-815ECDD0800E}"/>
-          </ac:picMkLst>
-        </pc:picChg>
-      </pc:sldChg>
-      <pc:sldChg chg="addSp modSp new mod">
-        <pc:chgData name="Anish Wadatkar" userId="409be691f56e0aa4" providerId="LiveId" clId="{FE36FFDD-CF39-40CA-B82B-3FB984666D92}" dt="2025-12-30T12:16:16.954" v="372" actId="1076"/>
-        <pc:sldMkLst>
-          <pc:docMk/>
-          <pc:sldMk cId="4142073658" sldId="282"/>
-        </pc:sldMkLst>
-        <pc:spChg chg="mod">
-          <ac:chgData name="Anish Wadatkar" userId="409be691f56e0aa4" providerId="LiveId" clId="{FE36FFDD-CF39-40CA-B82B-3FB984666D92}" dt="2025-12-30T12:15:56.912" v="370" actId="1076"/>
-          <ac:spMkLst>
-            <pc:docMk/>
-            <pc:sldMk cId="4142073658" sldId="282"/>
-            <ac:spMk id="2" creationId="{11BE2B34-D174-CB54-7C69-A39B407E50A3}"/>
-          </ac:spMkLst>
-        </pc:spChg>
-        <pc:picChg chg="add mod">
-          <ac:chgData name="Anish Wadatkar" userId="409be691f56e0aa4" providerId="LiveId" clId="{FE36FFDD-CF39-40CA-B82B-3FB984666D92}" dt="2025-12-30T12:16:16.954" v="372" actId="1076"/>
-          <ac:picMkLst>
-            <pc:docMk/>
-            <pc:sldMk cId="4142073658" sldId="282"/>
-            <ac:picMk id="4" creationId="{D5BE2B0C-DE06-1124-8F07-E3DA3D81C904}"/>
-          </ac:picMkLst>
-        </pc:picChg>
-      </pc:sldChg>
-      <pc:sldChg chg="addSp modSp new mod">
-        <pc:chgData name="Anish Wadatkar" userId="409be691f56e0aa4" providerId="LiveId" clId="{FE36FFDD-CF39-40CA-B82B-3FB984666D92}" dt="2025-12-30T12:17:33.081" v="385" actId="1076"/>
-        <pc:sldMkLst>
-          <pc:docMk/>
-          <pc:sldMk cId="502186581" sldId="283"/>
-        </pc:sldMkLst>
-        <pc:spChg chg="mod">
-          <ac:chgData name="Anish Wadatkar" userId="409be691f56e0aa4" providerId="LiveId" clId="{FE36FFDD-CF39-40CA-B82B-3FB984666D92}" dt="2025-12-30T12:17:23.369" v="384" actId="1076"/>
-          <ac:spMkLst>
-            <pc:docMk/>
-            <pc:sldMk cId="502186581" sldId="283"/>
-            <ac:spMk id="2" creationId="{D8F34E1A-3C6E-4777-E408-E49836A39C79}"/>
-          </ac:spMkLst>
-        </pc:spChg>
-        <pc:picChg chg="add mod">
-          <ac:chgData name="Anish Wadatkar" userId="409be691f56e0aa4" providerId="LiveId" clId="{FE36FFDD-CF39-40CA-B82B-3FB984666D92}" dt="2025-12-30T12:17:33.081" v="385" actId="1076"/>
-          <ac:picMkLst>
-            <pc:docMk/>
-            <pc:sldMk cId="502186581" sldId="283"/>
-            <ac:picMk id="4" creationId="{3F25C7AF-335E-6538-8394-0CE757AD9024}"/>
-          </ac:picMkLst>
-        </pc:picChg>
-      </pc:sldChg>
-      <pc:sldChg chg="addSp modSp new mod">
-        <pc:chgData name="Anish Wadatkar" userId="409be691f56e0aa4" providerId="LiveId" clId="{FE36FFDD-CF39-40CA-B82B-3FB984666D92}" dt="2025-12-30T12:18:08.139" v="391" actId="1076"/>
-        <pc:sldMkLst>
-          <pc:docMk/>
-          <pc:sldMk cId="3901031825" sldId="284"/>
-        </pc:sldMkLst>
-        <pc:spChg chg="mod">
-          <ac:chgData name="Anish Wadatkar" userId="409be691f56e0aa4" providerId="LiveId" clId="{FE36FFDD-CF39-40CA-B82B-3FB984666D92}" dt="2025-12-30T12:17:51.754" v="388" actId="1076"/>
-          <ac:spMkLst>
-            <pc:docMk/>
-            <pc:sldMk cId="3901031825" sldId="284"/>
-            <ac:spMk id="2" creationId="{0989F202-5808-0F18-ADB0-AC523B40488B}"/>
-          </ac:spMkLst>
-        </pc:spChg>
-        <pc:picChg chg="add mod">
-          <ac:chgData name="Anish Wadatkar" userId="409be691f56e0aa4" providerId="LiveId" clId="{FE36FFDD-CF39-40CA-B82B-3FB984666D92}" dt="2025-12-30T12:18:08.139" v="391" actId="1076"/>
-          <ac:picMkLst>
-            <pc:docMk/>
-            <pc:sldMk cId="3901031825" sldId="284"/>
-            <ac:picMk id="4" creationId="{0E6315BF-AD8A-FC72-096E-CEAFE1EB3C88}"/>
-          </ac:picMkLst>
-        </pc:picChg>
-      </pc:sldChg>
-      <pc:sldChg chg="addSp modSp new mod">
-        <pc:chgData name="Anish Wadatkar" userId="409be691f56e0aa4" providerId="LiveId" clId="{FE36FFDD-CF39-40CA-B82B-3FB984666D92}" dt="2025-12-30T12:19:03.450" v="400" actId="1076"/>
-        <pc:sldMkLst>
-          <pc:docMk/>
-          <pc:sldMk cId="2731656342" sldId="285"/>
-        </pc:sldMkLst>
-        <pc:spChg chg="mod">
-          <ac:chgData name="Anish Wadatkar" userId="409be691f56e0aa4" providerId="LiveId" clId="{FE36FFDD-CF39-40CA-B82B-3FB984666D92}" dt="2025-12-30T12:18:54.325" v="399" actId="255"/>
-          <ac:spMkLst>
-            <pc:docMk/>
-            <pc:sldMk cId="2731656342" sldId="285"/>
-            <ac:spMk id="2" creationId="{2A6F309C-73E9-BC1E-CE21-CB5F73F943DA}"/>
-          </ac:spMkLst>
-        </pc:spChg>
-        <pc:picChg chg="add mod">
-          <ac:chgData name="Anish Wadatkar" userId="409be691f56e0aa4" providerId="LiveId" clId="{FE36FFDD-CF39-40CA-B82B-3FB984666D92}" dt="2025-12-30T12:19:03.450" v="400" actId="1076"/>
-          <ac:picMkLst>
-            <pc:docMk/>
-            <pc:sldMk cId="2731656342" sldId="285"/>
-            <ac:picMk id="4" creationId="{9C64D03B-240C-E1CF-DC4E-71126F74ECBC}"/>
-          </ac:picMkLst>
-        </pc:picChg>
-      </pc:sldChg>
-      <pc:sldMasterChg chg="delSldLayout">
-        <pc:chgData name="Anish Wadatkar" userId="409be691f56e0aa4" providerId="LiveId" clId="{FE36FFDD-CF39-40CA-B82B-3FB984666D92}" dt="2025-12-30T11:09:25.066" v="31" actId="2696"/>
-        <pc:sldMasterMkLst>
-          <pc:docMk/>
-          <pc:sldMasterMk cId="0" sldId="2147483659"/>
-        </pc:sldMasterMkLst>
-        <pc:sldLayoutChg chg="del">
-          <pc:chgData name="Anish Wadatkar" userId="409be691f56e0aa4" providerId="LiveId" clId="{FE36FFDD-CF39-40CA-B82B-3FB984666D92}" dt="2025-12-30T11:09:25.066" v="31" actId="2696"/>
-          <pc:sldLayoutMkLst>
-            <pc:docMk/>
-            <pc:sldMasterMk cId="0" sldId="2147483659"/>
-            <pc:sldLayoutMk cId="0" sldId="2147483658"/>
-          </pc:sldLayoutMkLst>
-        </pc:sldLayoutChg>
-      </pc:sldMasterChg>
-    </pc:docChg>
-  </pc:docChgLst>
-</pc:chgInfo>
 </file>
 
 <file path=ppt/notesMasters/notesMaster1.xml><?xml version="1.0" encoding="utf-8"?>
@@ -9095,7 +8402,9 @@
         </p:nvSpPr>
         <p:spPr/>
         <p:txBody>
-          <a:bodyPr/>
+          <a:bodyPr>
+            <a:normAutofit fontScale="92500" lnSpcReduction="10000"/>
+          </a:bodyPr>
           <a:lstStyle/>
           <a:p>
             <a:r>
@@ -9157,8 +8466,18 @@
                   <a:schemeClr val="tx1"/>
                 </a:solidFill>
               </a:rPr>
-              <a:t>Correlation analysis between company size and mental health support</a:t>
-            </a:r>
+              <a:t>Correlation analysis between company size and mental health support. Integrating this dataset with the 2016 and later mental health surveys could provide longitudinal insights into evolving workplace attitudes</a:t>
+            </a:r>
+          </a:p>
+          <a:p>
+            <a:pPr marL="114300" indent="0">
+              <a:buNone/>
+            </a:pPr>
+            <a:endParaRPr lang="en-US" sz="2400" dirty="0">
+              <a:solidFill>
+                <a:schemeClr val="tx1"/>
+              </a:solidFill>
+            </a:endParaRPr>
           </a:p>
           <a:p>
             <a:endParaRPr lang="en-IN" dirty="0"/>
@@ -9353,6 +8672,203 @@
     <p:extLst>
       <p:ext uri="{BB962C8B-B14F-4D97-AF65-F5344CB8AC3E}">
         <p14:creationId xmlns:p14="http://schemas.microsoft.com/office/powerpoint/2010/main" val="2379224717"/>
+      </p:ext>
+    </p:extLst>
+  </p:cSld>
+  <p:clrMapOvr>
+    <a:masterClrMapping/>
+  </p:clrMapOvr>
+</p:sld>
+</file>
+
+<file path=ppt/slides/slide27.xml><?xml version="1.0" encoding="utf-8"?>
+<p:sld xmlns:a="http://schemas.openxmlformats.org/drawingml/2006/main" xmlns:r="http://schemas.openxmlformats.org/officeDocument/2006/relationships" xmlns:p="http://schemas.openxmlformats.org/presentationml/2006/main">
+  <p:cSld>
+    <p:spTree>
+      <p:nvGrpSpPr>
+        <p:cNvPr id="1" name=""/>
+        <p:cNvGrpSpPr/>
+        <p:nvPr/>
+      </p:nvGrpSpPr>
+      <p:grpSpPr>
+        <a:xfrm>
+          <a:off x="0" y="0"/>
+          <a:ext cx="0" cy="0"/>
+          <a:chOff x="0" y="0"/>
+          <a:chExt cx="0" cy="0"/>
+        </a:xfrm>
+      </p:grpSpPr>
+      <p:sp>
+        <p:nvSpPr>
+          <p:cNvPr id="2" name="Title 1">
+            <a:extLst>
+              <a:ext uri="{FF2B5EF4-FFF2-40B4-BE49-F238E27FC236}">
+                <a16:creationId xmlns:a16="http://schemas.microsoft.com/office/drawing/2014/main" id="{CF22A98C-B097-0788-7360-340B2011B3E5}"/>
+              </a:ext>
+            </a:extLst>
+          </p:cNvPr>
+          <p:cNvSpPr>
+            <a:spLocks noGrp="1"/>
+          </p:cNvSpPr>
+          <p:nvPr>
+            <p:ph type="title"/>
+          </p:nvPr>
+        </p:nvSpPr>
+        <p:spPr>
+          <a:xfrm>
+            <a:off x="311700" y="309057"/>
+            <a:ext cx="8520600" cy="572700"/>
+          </a:xfrm>
+        </p:spPr>
+        <p:txBody>
+          <a:bodyPr>
+            <a:normAutofit fontScale="90000"/>
+          </a:bodyPr>
+          <a:lstStyle/>
+          <a:p>
+            <a:r>
+              <a:rPr lang="en-IN" sz="4000" dirty="0"/>
+              <a:t>Project Repository</a:t>
+            </a:r>
+            <a:br>
+              <a:rPr lang="en-IN" dirty="0"/>
+            </a:br>
+            <a:endParaRPr lang="en-IN" dirty="0"/>
+          </a:p>
+        </p:txBody>
+      </p:sp>
+      <p:sp>
+        <p:nvSpPr>
+          <p:cNvPr id="3" name="Text Placeholder 2">
+            <a:extLst>
+              <a:ext uri="{FF2B5EF4-FFF2-40B4-BE49-F238E27FC236}">
+                <a16:creationId xmlns:a16="http://schemas.microsoft.com/office/drawing/2014/main" id="{F626EF51-FFE3-B473-6FC1-F19C88B3BD37}"/>
+              </a:ext>
+            </a:extLst>
+          </p:cNvPr>
+          <p:cNvSpPr>
+            <a:spLocks noGrp="1"/>
+          </p:cNvSpPr>
+          <p:nvPr>
+            <p:ph type="body" idx="1"/>
+          </p:nvPr>
+        </p:nvSpPr>
+        <p:spPr>
+          <a:xfrm>
+            <a:off x="311700" y="1131693"/>
+            <a:ext cx="8520600" cy="3416400"/>
+          </a:xfrm>
+        </p:spPr>
+        <p:txBody>
+          <a:bodyPr/>
+          <a:lstStyle/>
+          <a:p>
+            <a:pPr marL="114300" indent="0">
+              <a:buNone/>
+            </a:pPr>
+            <a:r>
+              <a:rPr lang="en-US" sz="2400" dirty="0">
+                <a:solidFill>
+                  <a:schemeClr val="tx1"/>
+                </a:solidFill>
+              </a:rPr>
+              <a:t>GitHub Repository:</a:t>
+            </a:r>
+          </a:p>
+          <a:p>
+            <a:pPr marL="114300" indent="0">
+              <a:buNone/>
+            </a:pPr>
+            <a:r>
+              <a:rPr lang="en-US" sz="2400" dirty="0">
+                <a:solidFill>
+                  <a:schemeClr val="tx1"/>
+                </a:solidFill>
+                <a:hlinkClick r:id="rId2"/>
+              </a:rPr>
+              <a:t>https://github.com/Anish8800/Mental-Health-EDA</a:t>
+            </a:r>
+            <a:endParaRPr lang="en-US" sz="2400" dirty="0">
+              <a:solidFill>
+                <a:schemeClr val="tx1"/>
+              </a:solidFill>
+            </a:endParaRPr>
+          </a:p>
+          <a:p>
+            <a:endParaRPr lang="en-US" sz="2400" dirty="0">
+              <a:solidFill>
+                <a:schemeClr val="tx1"/>
+              </a:solidFill>
+            </a:endParaRPr>
+          </a:p>
+          <a:p>
+            <a:pPr marL="114300" indent="0">
+              <a:buNone/>
+            </a:pPr>
+            <a:r>
+              <a:rPr lang="en-US" sz="2400" dirty="0">
+                <a:solidFill>
+                  <a:schemeClr val="tx1"/>
+                </a:solidFill>
+              </a:rPr>
+              <a:t>This repository contains:</a:t>
+            </a:r>
+          </a:p>
+          <a:p>
+            <a:r>
+              <a:rPr lang="en-US" sz="2400" dirty="0">
+                <a:solidFill>
+                  <a:schemeClr val="tx1"/>
+                </a:solidFill>
+              </a:rPr>
+              <a:t>• Complete </a:t>
+            </a:r>
+            <a:r>
+              <a:rPr lang="en-US" sz="2400" dirty="0" err="1">
+                <a:solidFill>
+                  <a:schemeClr val="tx1"/>
+                </a:solidFill>
+              </a:rPr>
+              <a:t>Jupyter</a:t>
+            </a:r>
+            <a:r>
+              <a:rPr lang="en-US" sz="2400" dirty="0">
+                <a:solidFill>
+                  <a:schemeClr val="tx1"/>
+                </a:solidFill>
+              </a:rPr>
+              <a:t> Notebook with EDA and visualizations</a:t>
+            </a:r>
+          </a:p>
+          <a:p>
+            <a:r>
+              <a:rPr lang="en-US" sz="2400" dirty="0">
+                <a:solidFill>
+                  <a:schemeClr val="tx1"/>
+                </a:solidFill>
+              </a:rPr>
+              <a:t>• Cleaned dataset used for analysis</a:t>
+            </a:r>
+          </a:p>
+          <a:p>
+            <a:r>
+              <a:rPr lang="en-US" sz="2400" dirty="0">
+                <a:solidFill>
+                  <a:schemeClr val="tx1"/>
+                </a:solidFill>
+              </a:rPr>
+              <a:t>• PowerPoint presentation summarizing insights</a:t>
+            </a:r>
+          </a:p>
+          <a:p>
+            <a:endParaRPr lang="en-IN" dirty="0"/>
+          </a:p>
+        </p:txBody>
+      </p:sp>
+    </p:spTree>
+    <p:extLst>
+      <p:ext uri="{BB962C8B-B14F-4D97-AF65-F5344CB8AC3E}">
+        <p14:creationId xmlns:p14="http://schemas.microsoft.com/office/powerpoint/2010/main" val="2856955557"/>
       </p:ext>
     </p:extLst>
   </p:cSld>

</xml_diff>